<commit_message>
o updated code examples...
</commit_message>
<xml_diff>
--- a/slides/c03-Inheritance.and.Polymorphism.pptx
+++ b/slides/c03-Inheritance.and.Polymorphism.pptx
@@ -248,7 +248,7 @@
             <a:fld id="{B2B2FCEE-F6CE-4B8D-9B1B-4676A6BB0AFB}" type="datetimeFigureOut">
               <a:rPr lang="en-US" smtClean="0"/>
               <a:pPr/>
-              <a:t>9/5/2018</a:t>
+              <a:t>9/11/2019</a:t>
             </a:fld>
             <a:endParaRPr lang="en-US"/>
           </a:p>
@@ -415,7 +415,7 @@
             <a:fld id="{E1764091-E49F-4F14-951E-D59F416DB54B}" type="datetimeFigureOut">
               <a:rPr lang="en-US" smtClean="0"/>
               <a:pPr/>
-              <a:t>9/5/2018</a:t>
+              <a:t>9/11/2019</a:t>
             </a:fld>
             <a:endParaRPr lang="en-US" dirty="0"/>
           </a:p>
@@ -753,7 +753,7 @@
             <a:fld id="{F995E067-F3D4-4413-BB67-68352E201922}" type="datetime3">
               <a:rPr lang="en-US"/>
               <a:pPr/>
-              <a:t>5 September 2018</a:t>
+              <a:t>11 September 2019</a:t>
             </a:fld>
             <a:endParaRPr lang="en-US"/>
           </a:p>
@@ -896,7 +896,7 @@
             <a:fld id="{3F15D5D6-3076-4D71-9E30-20ABB1D1B1D1}" type="datetime3">
               <a:rPr lang="en-US"/>
               <a:pPr/>
-              <a:t>5 September 2018</a:t>
+              <a:t>11 September 2019</a:t>
             </a:fld>
             <a:endParaRPr lang="en-US"/>
           </a:p>
@@ -1042,7 +1042,7 @@
             <a:fld id="{4BD5AE5A-CEB9-4810-804D-8A17CB89DC95}" type="datetime3">
               <a:rPr lang="en-US"/>
               <a:pPr/>
-              <a:t>5 September 2018</a:t>
+              <a:t>11 September 2019</a:t>
             </a:fld>
             <a:endParaRPr lang="en-US"/>
           </a:p>
@@ -1194,7 +1194,7 @@
             <a:fld id="{D3936FD9-2932-4372-82BF-79FFDEC719C5}" type="datetime3">
               <a:rPr lang="en-US" smtClean="0"/>
               <a:pPr defTabSz="910285"/>
-              <a:t>5 September 2018</a:t>
+              <a:t>11 September 2019</a:t>
             </a:fld>
             <a:endParaRPr lang="en-US" smtClean="0"/>
           </a:p>
@@ -1341,7 +1341,7 @@
             <a:fld id="{05DB3AAA-FAF0-4A18-9D27-5A7AE439CF7D}" type="datetime3">
               <a:rPr lang="en-US" smtClean="0"/>
               <a:pPr defTabSz="910285"/>
-              <a:t>5 September 2018</a:t>
+              <a:t>11 September 2019</a:t>
             </a:fld>
             <a:endParaRPr lang="en-US" smtClean="0"/>
           </a:p>
@@ -7318,7 +7318,62 @@
             <a:pPr eaLnBrk="1" hangingPunct="1"/>
             <a:r>
               <a:rPr lang="en-US" sz="2800" dirty="0" smtClean="0"/>
-              <a:t>Every object inherits from “Object”</a:t>
+              <a:t>Every object inherits from “Object</a:t>
+            </a:r>
+            <a:r>
+              <a:rPr lang="en-US" sz="2800" dirty="0" smtClean="0"/>
+              <a:t>”</a:t>
+            </a:r>
+          </a:p>
+          <a:p>
+            <a:pPr lvl="1"/>
+            <a:r>
+              <a:rPr lang="en-US" sz="2400" dirty="0" smtClean="0"/>
+              <a:t>Except for primitives</a:t>
+            </a:r>
+          </a:p>
+          <a:p>
+            <a:pPr lvl="2"/>
+            <a:r>
+              <a:rPr lang="en-US" sz="2000" dirty="0"/>
+              <a:t>i</a:t>
+            </a:r>
+            <a:r>
+              <a:rPr lang="en-US" sz="2000" dirty="0" smtClean="0"/>
+              <a:t>nt, float, double, char, boolean, byte, short, long</a:t>
+            </a:r>
+          </a:p>
+          <a:p>
+            <a:pPr lvl="1"/>
+            <a:r>
+              <a:rPr lang="en-US" sz="2400" dirty="0" smtClean="0"/>
+              <a:t>Note the class versions of primitives are</a:t>
+            </a:r>
+          </a:p>
+          <a:p>
+            <a:pPr lvl="2"/>
+            <a:r>
+              <a:rPr lang="en-US" sz="2000" dirty="0" smtClean="0"/>
+              <a:t>Integer, Float, Double</a:t>
+            </a:r>
+            <a:r>
+              <a:rPr lang="en-US" sz="2000" smtClean="0"/>
+              <a:t>, Character, Boolean, Byte, Short, Long</a:t>
+            </a:r>
+            <a:endParaRPr lang="en-US" sz="2000" dirty="0" smtClean="0"/>
+          </a:p>
+          <a:p>
+            <a:pPr lvl="2"/>
+            <a:r>
+              <a:rPr lang="en-US" sz="2000" dirty="0" smtClean="0"/>
+              <a:t>Ex: int x = Integer.parseInt( “8” );</a:t>
+            </a:r>
+          </a:p>
+          <a:p>
+            <a:pPr lvl="2"/>
+            <a:r>
+              <a:rPr lang="en-US" sz="2000" dirty="0" smtClean="0"/>
+              <a:t>Integer xx = new Integer( x );</a:t>
             </a:r>
           </a:p>
         </p:txBody>
@@ -8104,20 +8159,12 @@
               <a:rPr lang="en-US" sz="2800" dirty="0" smtClean="0"/>
               <a:t>Four levels of variable and </a:t>
             </a:r>
-            <a:r>
-              <a:rPr lang="en-US" sz="2800" dirty="0" smtClean="0"/>
-              <a:t/>
-            </a:r>
             <a:br>
               <a:rPr lang="en-US" sz="2800" dirty="0" smtClean="0"/>
             </a:br>
             <a:r>
               <a:rPr lang="en-US" sz="2800" dirty="0" smtClean="0"/>
-              <a:t>method </a:t>
-            </a:r>
-            <a:r>
-              <a:rPr lang="en-US" sz="2800" dirty="0" smtClean="0"/>
-              <a:t>access control</a:t>
+              <a:t>method access control</a:t>
             </a:r>
           </a:p>
           <a:p>
@@ -8175,8 +8222,21 @@
             </a:r>
             <a:r>
               <a:rPr lang="en-US" sz="2400" dirty="0" smtClean="0"/>
-              <a:t> (same as default) except allows inheritance of protected items to subclasses even outside the package. </a:t>
-            </a:r>
+              <a:t> </a:t>
+            </a:r>
+            <a:r>
+              <a:rPr lang="en-US" sz="2400" dirty="0" smtClean="0"/>
+              <a:t>accessible inside package and outside via inherited</a:t>
+            </a:r>
+            <a:r>
+              <a:rPr lang="en-US" sz="2400" dirty="0"/>
+              <a:t> </a:t>
+            </a:r>
+            <a:r>
+              <a:rPr lang="en-US" sz="2400" dirty="0" smtClean="0"/>
+              <a:t>subclasses</a:t>
+            </a:r>
+            <a:endParaRPr lang="en-US" sz="2400" dirty="0" smtClean="0"/>
           </a:p>
           <a:p>
             <a:pPr lvl="1" eaLnBrk="1" hangingPunct="1"/>
@@ -8186,8 +8246,13 @@
             </a:r>
             <a:r>
               <a:rPr lang="en-US" sz="2400" dirty="0" smtClean="0"/>
-              <a:t> not inherited</a:t>
-            </a:r>
+              <a:t> not </a:t>
+            </a:r>
+            <a:r>
+              <a:rPr lang="en-US" sz="2400" dirty="0" smtClean="0"/>
+              <a:t>inherited, only accessibe in declared class</a:t>
+            </a:r>
+            <a:endParaRPr lang="en-US" sz="2400" dirty="0" smtClean="0"/>
           </a:p>
           <a:p>
             <a:pPr lvl="1" eaLnBrk="1" hangingPunct="1"/>

</xml_diff>